<commit_message>
Use case diagram for project proposal uploaded
</commit_message>
<xml_diff>
--- a/Docs/Project Proposal.pptx
+++ b/Docs/Project Proposal.pptx
@@ -4308,10 +4308,10 @@
       </p:sp>
       <p:pic>
         <p:nvPicPr>
-          <p:cNvPr id="5" name="Elemento grafico 4">
+          <p:cNvPr id="4" name="Elemento grafico 3">
             <a:extLst>
               <a:ext uri="{FF2B5EF4-FFF2-40B4-BE49-F238E27FC236}">
-                <a16:creationId xmlns:a16="http://schemas.microsoft.com/office/drawing/2014/main" id="{7B92B213-EEC6-65D5-700A-56EF9F7ECEDF}"/>
+                <a16:creationId xmlns:a16="http://schemas.microsoft.com/office/drawing/2014/main" id="{89154A41-B1DE-BC4B-2100-FAEC234324AC}"/>
               </a:ext>
             </a:extLst>
           </p:cNvPr>
@@ -4334,8 +4334,8 @@
         </p:blipFill>
         <p:spPr>
           <a:xfrm>
-            <a:off x="2782771" y="1233093"/>
-            <a:ext cx="3561735" cy="4787799"/>
+            <a:off x="2790950" y="1285169"/>
+            <a:ext cx="3562100" cy="4817408"/>
           </a:xfrm>
           <a:prstGeom prst="rect">
             <a:avLst/>

</xml_diff>

<commit_message>
Presentation for project proposal updated
</commit_message>
<xml_diff>
--- a/Docs/Project Proposal.pptx
+++ b/Docs/Project Proposal.pptx
@@ -4866,13 +4866,14 @@
               <a:buChar char="•"/>
             </a:pPr>
             <a:r>
-              <a:rPr lang="en-US" b="1" i="1" dirty="0"/>
-              <a:t>Hot posts of the day</a:t>
-            </a:r>
-            <a:r>
-              <a:rPr lang="en-US" dirty="0"/>
-              <a:t>, top 10 most commented posts of the day</a:t>
-            </a:r>
+              <a:rPr lang="en-US" b="1" i="1"/>
+              <a:t>Hot posts of a reporter</a:t>
+            </a:r>
+            <a:r>
+              <a:rPr lang="en-US"/>
+              <a:t>, top 10 most commented posts of a reporter</a:t>
+            </a:r>
+            <a:endParaRPr lang="en-US" dirty="0"/>
           </a:p>
           <a:p>
             <a:pPr marL="285750" indent="-285750">

</xml_diff>